<commit_message>
Deploying to gh-pages from @ tpaknok/EcoCoMix@386f7e05b4a430709e0e1c33fac6502cc75179d3 🚀
</commit_message>
<xml_diff>
--- a/reference/figures/Others/Logo.pptx
+++ b/reference/figures/Others/Logo.pptx
@@ -6,6 +6,7 @@
   </p:sldMasterIdLst>
   <p:sldIdLst>
     <p:sldId id="256" r:id="rId2"/>
+    <p:sldId id="258" r:id="rId3"/>
   </p:sldIdLst>
   <p:sldSz cx="1828800" cy="1581150"/>
   <p:notesSz cx="6858000" cy="9144000"/>
@@ -116,7 +117,7 @@
 <p1510:revInfo xmlns:a="http://schemas.openxmlformats.org/drawingml/2006/main" xmlns:r="http://schemas.openxmlformats.org/officeDocument/2006/relationships" xmlns:p1510="http://schemas.microsoft.com/office/powerpoint/2015/10/main">
   <p1510:revLst>
     <p1510:client id="{3AA9168F-D3C4-40B7-A024-8272BB34E8E6}" v="2" dt="2025-01-15T19:19:19.155"/>
-    <p1510:client id="{4908D953-FD89-4161-B6E0-5FB59F528749}" v="1" dt="2025-01-15T19:47:32.268"/>
+    <p1510:client id="{4908D953-FD89-4161-B6E0-5FB59F528749}" v="83" dt="2025-01-16T17:59:27.451"/>
   </p1510:revLst>
 </p1510:revInfo>
 </file>
@@ -165,8 +166,8 @@
   </pc:docChgLst>
   <pc:docChgLst>
     <pc:chgData name="Toby Tsang" userId="e597de51-a393-472f-96bf-05139d3f58b1" providerId="ADAL" clId="{4908D953-FD89-4161-B6E0-5FB59F528749}"/>
-    <pc:docChg chg="undo redo custSel modSld">
-      <pc:chgData name="Toby Tsang" userId="e597de51-a393-472f-96bf-05139d3f58b1" providerId="ADAL" clId="{4908D953-FD89-4161-B6E0-5FB59F528749}" dt="2025-01-15T19:51:16.501" v="31" actId="1076"/>
+    <pc:docChg chg="undo redo custSel addSld delSld modSld">
+      <pc:chgData name="Toby Tsang" userId="e597de51-a393-472f-96bf-05139d3f58b1" providerId="ADAL" clId="{4908D953-FD89-4161-B6E0-5FB59F528749}" dt="2025-01-16T18:04:33.008" v="247" actId="207"/>
       <pc:docMkLst>
         <pc:docMk/>
       </pc:docMkLst>
@@ -201,6 +202,116 @@
           </ac:picMkLst>
         </pc:picChg>
       </pc:sldChg>
+      <pc:sldChg chg="addSp delSp modSp add del mod">
+        <pc:chgData name="Toby Tsang" userId="e597de51-a393-472f-96bf-05139d3f58b1" providerId="ADAL" clId="{4908D953-FD89-4161-B6E0-5FB59F528749}" dt="2025-01-16T17:58:12.229" v="174" actId="47"/>
+        <pc:sldMkLst>
+          <pc:docMk/>
+          <pc:sldMk cId="1527862372" sldId="257"/>
+        </pc:sldMkLst>
+        <pc:spChg chg="mod topLvl">
+          <ac:chgData name="Toby Tsang" userId="e597de51-a393-472f-96bf-05139d3f58b1" providerId="ADAL" clId="{4908D953-FD89-4161-B6E0-5FB59F528749}" dt="2025-01-16T17:55:46.747" v="146" actId="1076"/>
+          <ac:spMkLst>
+            <pc:docMk/>
+            <pc:sldMk cId="1527862372" sldId="257"/>
+            <ac:spMk id="6" creationId="{E67F61A1-3693-5D19-573D-630D14CA1229}"/>
+          </ac:spMkLst>
+        </pc:spChg>
+        <pc:grpChg chg="del">
+          <ac:chgData name="Toby Tsang" userId="e597de51-a393-472f-96bf-05139d3f58b1" providerId="ADAL" clId="{4908D953-FD89-4161-B6E0-5FB59F528749}" dt="2025-01-16T17:46:52.107" v="33" actId="478"/>
+          <ac:grpSpMkLst>
+            <pc:docMk/>
+            <pc:sldMk cId="1527862372" sldId="257"/>
+            <ac:grpSpMk id="2" creationId="{1DC66342-24B3-7F11-FDBB-9C0E889B5094}"/>
+          </ac:grpSpMkLst>
+        </pc:grpChg>
+        <pc:picChg chg="add mod ord">
+          <ac:chgData name="Toby Tsang" userId="e597de51-a393-472f-96bf-05139d3f58b1" providerId="ADAL" clId="{4908D953-FD89-4161-B6E0-5FB59F528749}" dt="2025-01-16T17:54:07.323" v="139" actId="14100"/>
+          <ac:picMkLst>
+            <pc:docMk/>
+            <pc:sldMk cId="1527862372" sldId="257"/>
+            <ac:picMk id="4" creationId="{08C89D8D-A0E9-1365-6F91-7EE219404687}"/>
+          </ac:picMkLst>
+        </pc:picChg>
+        <pc:picChg chg="del topLvl">
+          <ac:chgData name="Toby Tsang" userId="e597de51-a393-472f-96bf-05139d3f58b1" providerId="ADAL" clId="{4908D953-FD89-4161-B6E0-5FB59F528749}" dt="2025-01-16T17:46:52.107" v="33" actId="478"/>
+          <ac:picMkLst>
+            <pc:docMk/>
+            <pc:sldMk cId="1527862372" sldId="257"/>
+            <ac:picMk id="5" creationId="{EBBAD555-7888-C88C-5DE3-499E569CD0F8}"/>
+          </ac:picMkLst>
+        </pc:picChg>
+        <pc:picChg chg="add mod">
+          <ac:chgData name="Toby Tsang" userId="e597de51-a393-472f-96bf-05139d3f58b1" providerId="ADAL" clId="{4908D953-FD89-4161-B6E0-5FB59F528749}" dt="2025-01-16T17:49:07.764" v="61"/>
+          <ac:picMkLst>
+            <pc:docMk/>
+            <pc:sldMk cId="1527862372" sldId="257"/>
+            <ac:picMk id="7" creationId="{3BAC50F9-1DCD-90B3-7657-E0A17FDB6040}"/>
+          </ac:picMkLst>
+        </pc:picChg>
+      </pc:sldChg>
+      <pc:sldChg chg="addSp delSp modSp new mod">
+        <pc:chgData name="Toby Tsang" userId="e597de51-a393-472f-96bf-05139d3f58b1" providerId="ADAL" clId="{4908D953-FD89-4161-B6E0-5FB59F528749}" dt="2025-01-16T18:04:33.008" v="247" actId="207"/>
+        <pc:sldMkLst>
+          <pc:docMk/>
+          <pc:sldMk cId="2173705689" sldId="258"/>
+        </pc:sldMkLst>
+        <pc:spChg chg="del">
+          <ac:chgData name="Toby Tsang" userId="e597de51-a393-472f-96bf-05139d3f58b1" providerId="ADAL" clId="{4908D953-FD89-4161-B6E0-5FB59F528749}" dt="2025-01-16T17:58:01.555" v="172" actId="478"/>
+          <ac:spMkLst>
+            <pc:docMk/>
+            <pc:sldMk cId="2173705689" sldId="258"/>
+            <ac:spMk id="2" creationId="{1E1D7F0A-46F8-78E2-5157-506E450B4532}"/>
+          </ac:spMkLst>
+        </pc:spChg>
+        <pc:spChg chg="del">
+          <ac:chgData name="Toby Tsang" userId="e597de51-a393-472f-96bf-05139d3f58b1" providerId="ADAL" clId="{4908D953-FD89-4161-B6E0-5FB59F528749}" dt="2025-01-16T17:55:31.907" v="141" actId="931"/>
+          <ac:spMkLst>
+            <pc:docMk/>
+            <pc:sldMk cId="2173705689" sldId="258"/>
+            <ac:spMk id="3" creationId="{EA46FE94-9C29-4C02-9CB7-C2DB551A7086}"/>
+          </ac:spMkLst>
+        </pc:spChg>
+        <pc:spChg chg="add mod ord">
+          <ac:chgData name="Toby Tsang" userId="e597de51-a393-472f-96bf-05139d3f58b1" providerId="ADAL" clId="{4908D953-FD89-4161-B6E0-5FB59F528749}" dt="2025-01-16T18:04:33.008" v="247" actId="207"/>
+          <ac:spMkLst>
+            <pc:docMk/>
+            <pc:sldMk cId="2173705689" sldId="258"/>
+            <ac:spMk id="9" creationId="{40436146-4EE9-336B-F813-41F1D1C927D0}"/>
+          </ac:spMkLst>
+        </pc:spChg>
+        <pc:picChg chg="add mod">
+          <ac:chgData name="Toby Tsang" userId="e597de51-a393-472f-96bf-05139d3f58b1" providerId="ADAL" clId="{4908D953-FD89-4161-B6E0-5FB59F528749}" dt="2025-01-16T17:49:52.686" v="73" actId="11530"/>
+          <ac:picMkLst>
+            <pc:docMk/>
+            <pc:sldMk cId="2173705689" sldId="258"/>
+            <ac:picMk id="4" creationId="{0B48C852-A33F-D301-2FE5-5F28040A1DF2}"/>
+          </ac:picMkLst>
+        </pc:picChg>
+        <pc:picChg chg="add del mod modCrop">
+          <ac:chgData name="Toby Tsang" userId="e597de51-a393-472f-96bf-05139d3f58b1" providerId="ADAL" clId="{4908D953-FD89-4161-B6E0-5FB59F528749}" dt="2025-01-16T17:53:14.042" v="127" actId="478"/>
+          <ac:picMkLst>
+            <pc:docMk/>
+            <pc:sldMk cId="2173705689" sldId="258"/>
+            <ac:picMk id="5" creationId="{2164B894-59E8-34BD-337B-6A5EF8FB1C65}"/>
+          </ac:picMkLst>
+        </pc:picChg>
+        <pc:picChg chg="add del mod">
+          <ac:chgData name="Toby Tsang" userId="e597de51-a393-472f-96bf-05139d3f58b1" providerId="ADAL" clId="{4908D953-FD89-4161-B6E0-5FB59F528749}" dt="2025-01-16T17:55:28.710" v="140" actId="478"/>
+          <ac:picMkLst>
+            <pc:docMk/>
+            <pc:sldMk cId="2173705689" sldId="258"/>
+            <ac:picMk id="6" creationId="{5E5286A4-62CC-DBFA-763F-5659F8ED1440}"/>
+          </ac:picMkLst>
+        </pc:picChg>
+        <pc:picChg chg="add mod">
+          <ac:chgData name="Toby Tsang" userId="e597de51-a393-472f-96bf-05139d3f58b1" providerId="ADAL" clId="{4908D953-FD89-4161-B6E0-5FB59F528749}" dt="2025-01-16T18:03:21.963" v="245" actId="1035"/>
+          <ac:picMkLst>
+            <pc:docMk/>
+            <pc:sldMk cId="2173705689" sldId="258"/>
+            <ac:picMk id="8" creationId="{8FF9EC07-E706-7DC7-9F55-BAB2F7A377B9}"/>
+          </ac:picMkLst>
+        </pc:picChg>
+      </pc:sldChg>
     </pc:docChg>
   </pc:docChgLst>
 </pc:chgInfo>
@@ -337,7 +448,7 @@
           <a:p>
             <a:fld id="{CA2DD1F8-1C69-4271-88D1-F0F9D8D63035}" type="datetimeFigureOut">
               <a:rPr lang="en-CA" smtClean="0"/>
-              <a:t>2025-01-15</a:t>
+              <a:t>2025-01-16</a:t>
             </a:fld>
             <a:endParaRPr lang="en-CA"/>
           </a:p>
@@ -507,7 +618,7 @@
           <a:p>
             <a:fld id="{CA2DD1F8-1C69-4271-88D1-F0F9D8D63035}" type="datetimeFigureOut">
               <a:rPr lang="en-CA" smtClean="0"/>
-              <a:t>2025-01-15</a:t>
+              <a:t>2025-01-16</a:t>
             </a:fld>
             <a:endParaRPr lang="en-CA"/>
           </a:p>
@@ -687,7 +798,7 @@
           <a:p>
             <a:fld id="{CA2DD1F8-1C69-4271-88D1-F0F9D8D63035}" type="datetimeFigureOut">
               <a:rPr lang="en-CA" smtClean="0"/>
-              <a:t>2025-01-15</a:t>
+              <a:t>2025-01-16</a:t>
             </a:fld>
             <a:endParaRPr lang="en-CA"/>
           </a:p>
@@ -857,7 +968,7 @@
           <a:p>
             <a:fld id="{CA2DD1F8-1C69-4271-88D1-F0F9D8D63035}" type="datetimeFigureOut">
               <a:rPr lang="en-CA" smtClean="0"/>
-              <a:t>2025-01-15</a:t>
+              <a:t>2025-01-16</a:t>
             </a:fld>
             <a:endParaRPr lang="en-CA"/>
           </a:p>
@@ -1103,7 +1214,7 @@
           <a:p>
             <a:fld id="{CA2DD1F8-1C69-4271-88D1-F0F9D8D63035}" type="datetimeFigureOut">
               <a:rPr lang="en-CA" smtClean="0"/>
-              <a:t>2025-01-15</a:t>
+              <a:t>2025-01-16</a:t>
             </a:fld>
             <a:endParaRPr lang="en-CA"/>
           </a:p>
@@ -1335,7 +1446,7 @@
           <a:p>
             <a:fld id="{CA2DD1F8-1C69-4271-88D1-F0F9D8D63035}" type="datetimeFigureOut">
               <a:rPr lang="en-CA" smtClean="0"/>
-              <a:t>2025-01-15</a:t>
+              <a:t>2025-01-16</a:t>
             </a:fld>
             <a:endParaRPr lang="en-CA"/>
           </a:p>
@@ -1702,7 +1813,7 @@
           <a:p>
             <a:fld id="{CA2DD1F8-1C69-4271-88D1-F0F9D8D63035}" type="datetimeFigureOut">
               <a:rPr lang="en-CA" smtClean="0"/>
-              <a:t>2025-01-15</a:t>
+              <a:t>2025-01-16</a:t>
             </a:fld>
             <a:endParaRPr lang="en-CA"/>
           </a:p>
@@ -1820,7 +1931,7 @@
           <a:p>
             <a:fld id="{CA2DD1F8-1C69-4271-88D1-F0F9D8D63035}" type="datetimeFigureOut">
               <a:rPr lang="en-CA" smtClean="0"/>
-              <a:t>2025-01-15</a:t>
+              <a:t>2025-01-16</a:t>
             </a:fld>
             <a:endParaRPr lang="en-CA"/>
           </a:p>
@@ -1915,7 +2026,7 @@
           <a:p>
             <a:fld id="{CA2DD1F8-1C69-4271-88D1-F0F9D8D63035}" type="datetimeFigureOut">
               <a:rPr lang="en-CA" smtClean="0"/>
-              <a:t>2025-01-15</a:t>
+              <a:t>2025-01-16</a:t>
             </a:fld>
             <a:endParaRPr lang="en-CA"/>
           </a:p>
@@ -2192,7 +2303,7 @@
           <a:p>
             <a:fld id="{CA2DD1F8-1C69-4271-88D1-F0F9D8D63035}" type="datetimeFigureOut">
               <a:rPr lang="en-CA" smtClean="0"/>
-              <a:t>2025-01-15</a:t>
+              <a:t>2025-01-16</a:t>
             </a:fld>
             <a:endParaRPr lang="en-CA"/>
           </a:p>
@@ -2449,7 +2560,7 @@
           <a:p>
             <a:fld id="{CA2DD1F8-1C69-4271-88D1-F0F9D8D63035}" type="datetimeFigureOut">
               <a:rPr lang="en-CA" smtClean="0"/>
-              <a:t>2025-01-15</a:t>
+              <a:t>2025-01-16</a:t>
             </a:fld>
             <a:endParaRPr lang="en-CA"/>
           </a:p>
@@ -2667,7 +2778,7 @@
           <a:p>
             <a:fld id="{CA2DD1F8-1C69-4271-88D1-F0F9D8D63035}" type="datetimeFigureOut">
               <a:rPr lang="en-CA" smtClean="0"/>
-              <a:t>2025-01-15</a:t>
+              <a:t>2025-01-16</a:t>
             </a:fld>
             <a:endParaRPr lang="en-CA"/>
           </a:p>
@@ -3199,6 +3310,180 @@
 </p:sld>
 </file>
 
+<file path=ppt/slides/slide2.xml><?xml version="1.0" encoding="utf-8"?>
+<p:sld xmlns:a="http://schemas.openxmlformats.org/drawingml/2006/main" xmlns:r="http://schemas.openxmlformats.org/officeDocument/2006/relationships" xmlns:p="http://schemas.openxmlformats.org/presentationml/2006/main">
+  <p:cSld>
+    <p:spTree>
+      <p:nvGrpSpPr>
+        <p:cNvPr id="1" name=""/>
+        <p:cNvGrpSpPr/>
+        <p:nvPr/>
+      </p:nvGrpSpPr>
+      <p:grpSpPr>
+        <a:xfrm>
+          <a:off x="0" y="0"/>
+          <a:ext cx="0" cy="0"/>
+          <a:chOff x="0" y="0"/>
+          <a:chExt cx="0" cy="0"/>
+        </a:xfrm>
+      </p:grpSpPr>
+      <p:sp>
+        <p:nvSpPr>
+          <p:cNvPr id="9" name="Hexagon 8">
+            <a:extLst>
+              <a:ext uri="{FF2B5EF4-FFF2-40B4-BE49-F238E27FC236}">
+                <a16:creationId xmlns:a16="http://schemas.microsoft.com/office/drawing/2014/main" id="{40436146-4EE9-336B-F813-41F1D1C927D0}"/>
+              </a:ext>
+            </a:extLst>
+          </p:cNvPr>
+          <p:cNvSpPr/>
+          <p:nvPr/>
+        </p:nvSpPr>
+        <p:spPr>
+          <a:xfrm rot="5400000">
+            <a:off x="146776" y="130495"/>
+            <a:ext cx="1535245" cy="1321882"/>
+          </a:xfrm>
+          <a:prstGeom prst="hexagon">
+            <a:avLst/>
+          </a:prstGeom>
+          <a:solidFill>
+            <a:schemeClr val="tx1">
+              <a:lumMod val="75000"/>
+              <a:lumOff val="25000"/>
+            </a:schemeClr>
+          </a:solidFill>
+          <a:ln w="28575">
+            <a:solidFill>
+              <a:srgbClr val="FF0000"/>
+            </a:solidFill>
+          </a:ln>
+        </p:spPr>
+        <p:style>
+          <a:lnRef idx="2">
+            <a:schemeClr val="accent1">
+              <a:shade val="15000"/>
+            </a:schemeClr>
+          </a:lnRef>
+          <a:fillRef idx="1">
+            <a:schemeClr val="accent1"/>
+          </a:fillRef>
+          <a:effectRef idx="0">
+            <a:schemeClr val="accent1"/>
+          </a:effectRef>
+          <a:fontRef idx="minor">
+            <a:schemeClr val="lt1"/>
+          </a:fontRef>
+        </p:style>
+        <p:txBody>
+          <a:bodyPr rtlCol="0" anchor="ctr"/>
+          <a:lstStyle/>
+          <a:p>
+            <a:pPr algn="ctr"/>
+            <a:endParaRPr lang="en-CA" dirty="0"/>
+          </a:p>
+        </p:txBody>
+      </p:sp>
+      <p:pic>
+        <p:nvPicPr>
+          <p:cNvPr id="8" name="Content Placeholder 7" descr="A cartoon of a dog&#10;&#10;AI-generated content may be incorrect.">
+            <a:extLst>
+              <a:ext uri="{FF2B5EF4-FFF2-40B4-BE49-F238E27FC236}">
+                <a16:creationId xmlns:a16="http://schemas.microsoft.com/office/drawing/2014/main" id="{8FF9EC07-E706-7DC7-9F55-BAB2F7A377B9}"/>
+              </a:ext>
+            </a:extLst>
+          </p:cNvPr>
+          <p:cNvPicPr>
+            <a:picLocks noGrp="1" noChangeAspect="1"/>
+          </p:cNvPicPr>
+          <p:nvPr>
+            <p:ph idx="1"/>
+          </p:nvPr>
+        </p:nvPicPr>
+        <p:blipFill>
+          <a:blip r:embed="rId2">
+            <a:extLst>
+              <a:ext uri="{BEBA8EAE-BF5A-486C-A8C5-ECC9F3942E4B}">
+                <a14:imgProps xmlns:a14="http://schemas.microsoft.com/office/drawing/2010/main">
+                  <a14:imgLayer r:embed="rId3">
+                    <a14:imgEffect>
+                      <a14:backgroundRemoval t="5859" b="89844" l="9961" r="92188">
+                        <a14:foregroundMark x1="29297" y1="9961" x2="32813" y2="9375"/>
+                        <a14:foregroundMark x1="67383" y1="9375" x2="74219" y2="8789"/>
+                        <a14:foregroundMark x1="47070" y1="51758" x2="48633" y2="53125"/>
+                        <a14:foregroundMark x1="62109" y1="20898" x2="70898" y2="32031"/>
+                        <a14:foregroundMark x1="27539" y1="11719" x2="31445" y2="9570"/>
+                        <a14:foregroundMark x1="11328" y1="85547" x2="15430" y2="87305"/>
+                        <a14:foregroundMark x1="33203" y1="89844" x2="68945" y2="88281"/>
+                        <a14:foregroundMark x1="87500" y1="60742" x2="88672" y2="66016"/>
+                        <a14:foregroundMark x1="89063" y1="51563" x2="92188" y2="54883"/>
+                        <a14:foregroundMark x1="90625" y1="51953" x2="91406" y2="52734"/>
+                        <a14:foregroundMark x1="47266" y1="51953" x2="52734" y2="56250"/>
+                        <a14:foregroundMark x1="64648" y1="22461" x2="67773" y2="27148"/>
+                        <a14:foregroundMark x1="28125" y1="10547" x2="31250" y2="9570"/>
+                        <a14:foregroundMark x1="31250" y1="9180" x2="29492" y2="8594"/>
+                        <a14:foregroundMark x1="25391" y1="17969" x2="32227" y2="9961"/>
+                        <a14:foregroundMark x1="24805" y1="16797" x2="31445" y2="9570"/>
+                        <a14:foregroundMark x1="25586" y1="15820" x2="26758" y2="12500"/>
+                        <a14:foregroundMark x1="26758" y1="12500" x2="26758" y2="12500"/>
+                        <a14:foregroundMark x1="25586" y1="14844" x2="29883" y2="8984"/>
+                        <a14:foregroundMark x1="30859" y1="8789" x2="30859" y2="8789"/>
+                        <a14:foregroundMark x1="31836" y1="8203" x2="28125" y2="9180"/>
+                        <a14:foregroundMark x1="30469" y1="8398" x2="29102" y2="8594"/>
+                        <a14:foregroundMark x1="29492" y1="8594" x2="28125" y2="9375"/>
+                        <a14:foregroundMark x1="28125" y1="9375" x2="26367" y2="10547"/>
+                        <a14:foregroundMark x1="26367" y1="10156" x2="26172" y2="12695"/>
+                        <a14:foregroundMark x1="62305" y1="14258" x2="67969" y2="8398"/>
+                        <a14:foregroundMark x1="68164" y1="8203" x2="72461" y2="7422"/>
+                        <a14:foregroundMark x1="69922" y1="7031" x2="73242" y2="6836"/>
+                        <a14:foregroundMark x1="72266" y1="6836" x2="75000" y2="8398"/>
+                        <a14:foregroundMark x1="75000" y1="8398" x2="77148" y2="12891"/>
+                        <a14:foregroundMark x1="74414" y1="7617" x2="70703" y2="6250"/>
+                        <a14:foregroundMark x1="72070" y1="6641" x2="76367" y2="12305"/>
+                        <a14:foregroundMark x1="76563" y1="13477" x2="76953" y2="16992"/>
+                        <a14:foregroundMark x1="76953" y1="17188" x2="68164" y2="7422"/>
+                        <a14:foregroundMark x1="74023" y1="6836" x2="66992" y2="8594"/>
+                        <a14:foregroundMark x1="68164" y1="7813" x2="72461" y2="6836"/>
+                        <a14:foregroundMark x1="72461" y1="6836" x2="67969" y2="7617"/>
+                        <a14:foregroundMark x1="70117" y1="7422" x2="72656" y2="7422"/>
+                        <a14:foregroundMark x1="73242" y1="6641" x2="72070" y2="6055"/>
+                        <a14:foregroundMark x1="72266" y1="5859" x2="73438" y2="6250"/>
+                        <a14:backgroundMark x1="41406" y1="94531" x2="42773" y2="93750"/>
+                        <a14:backgroundMark x1="42969" y1="92383" x2="42969" y2="92773"/>
+                      </a14:backgroundRemoval>
+                    </a14:imgEffect>
+                  </a14:imgLayer>
+                </a14:imgProps>
+              </a:ext>
+              <a:ext uri="{28A0092B-C50C-407E-A947-70E740481C1C}">
+                <a14:useLocalDpi xmlns:a14="http://schemas.microsoft.com/office/drawing/2010/main" val="0"/>
+              </a:ext>
+            </a:extLst>
+          </a:blip>
+          <a:stretch>
+            <a:fillRect/>
+          </a:stretch>
+        </p:blipFill>
+        <p:spPr>
+          <a:xfrm>
+            <a:off x="251552" y="120015"/>
+            <a:ext cx="1304833" cy="1304833"/>
+          </a:xfrm>
+        </p:spPr>
+      </p:pic>
+    </p:spTree>
+    <p:extLst>
+      <p:ext uri="{BB962C8B-B14F-4D97-AF65-F5344CB8AC3E}">
+        <p14:creationId xmlns:p14="http://schemas.microsoft.com/office/powerpoint/2010/main" val="2173705689"/>
+      </p:ext>
+    </p:extLst>
+  </p:cSld>
+  <p:clrMapOvr>
+    <a:masterClrMapping/>
+  </p:clrMapOvr>
+</p:sld>
+</file>
+
 <file path=ppt/theme/theme1.xml><?xml version="1.0" encoding="utf-8"?>
 <a:theme xmlns:a="http://schemas.openxmlformats.org/drawingml/2006/main" name="Office Theme">
   <a:themeElements>

</xml_diff>